<commit_message>
Deyisiklikler commit edildi 06:42 tarixinde
</commit_message>
<xml_diff>
--- a/GitSecond.pptx
+++ b/GitSecond.pptx
@@ -7916,6 +7916,13 @@
               <a:rPr lang="az-Latn-AZ" dirty="0"/>
               <a:t>əməliyyatına bərabərdir.</a:t>
             </a:r>
+            <a:endParaRPr lang="az-Latn-AZ" dirty="0"/>
+          </a:p>
+          <a:p>
+            <a:r>
+              <a:rPr lang="en-US" dirty="0"/>
+              <a:t>Salam menim adim Nurmehemmeddir.</a:t>
+            </a:r>
             <a:endParaRPr lang="en-US" dirty="0"/>
           </a:p>
         </p:txBody>

</xml_diff>